<commit_message>
Mods to lecture 6 (transport part 2)
</commit_message>
<xml_diff>
--- a/ex/552-F19/lectures/06-transport.pptx
+++ b/ex/552-F19/lectures/06-transport.pptx
@@ -14789,14 +14789,18 @@
             <a:pPr lvl="1"/>
             <a:r>
               <a:rPr lang="en-US" dirty="0"/>
-              <a:t>if the receiver did not receive a segment </a:t>
+              <a:t>if the receiver did not receive a packet</a:t>
             </a:r>
           </a:p>
           <a:p>
             <a:pPr lvl="1"/>
             <a:r>
               <a:rPr lang="en-US" dirty="0"/>
-              <a:t>but did receive a subsequent few segments (</a:t>
+              <a:t>but did receive a subsequent </a:t>
+            </a:r>
+            <a:r>
+              <a:rPr lang="en-US"/>
+              <a:t>few packets (</a:t>
             </a:r>
             <a:r>
               <a:rPr lang="en-US" dirty="0">
@@ -15957,7 +15961,7 @@
           <a:effectLst/>
           <a:extLst>
             <a:ext uri="{909E8E84-426E-40dd-AFC4-6F175D3DCCD1}">
-              <a14:hiddenFill xmlns="" xmlns:a14="http://schemas.microsoft.com/office/drawing/2010/main">
+              <a14:hiddenFill xmlns:a14="http://schemas.microsoft.com/office/drawing/2010/main" xmlns="">
                 <a:blipFill dpi="0" rotWithShape="0">
                   <a:blip/>
                   <a:srcRect/>
@@ -15968,7 +15972,7 @@
               </a14:hiddenFill>
             </a:ext>
             <a:ext uri="{91240B29-F687-4f45-9708-019B960494DF}">
-              <a14:hiddenLine xmlns="" xmlns:a14="http://schemas.microsoft.com/office/drawing/2010/main" w="9525">
+              <a14:hiddenLine xmlns:a14="http://schemas.microsoft.com/office/drawing/2010/main" xmlns="" w="9525">
                 <a:solidFill>
                   <a:srgbClr val="000000"/>
                 </a:solidFill>
@@ -15978,7 +15982,7 @@
               </a14:hiddenLine>
             </a:ext>
             <a:ext uri="{AF507438-7753-43e0-B8FC-AC1667EBCBE1}">
-              <a14:hiddenEffects xmlns="" xmlns:a14="http://schemas.microsoft.com/office/drawing/2010/main">
+              <a14:hiddenEffects xmlns:a14="http://schemas.microsoft.com/office/drawing/2010/main" xmlns="">
                 <a:effectLst>
                   <a:outerShdw blurRad="63500" dist="38099" dir="2700000" algn="ctr" rotWithShape="0">
                     <a:srgbClr val="000000">
@@ -16247,7 +16251,7 @@
           <a:effectLst/>
           <a:extLst>
             <a:ext uri="{909E8E84-426E-40dd-AFC4-6F175D3DCCD1}">
-              <a14:hiddenFill xmlns="" xmlns:a14="http://schemas.microsoft.com/office/drawing/2010/main">
+              <a14:hiddenFill xmlns:a14="http://schemas.microsoft.com/office/drawing/2010/main" xmlns="">
                 <a:blipFill dpi="0" rotWithShape="0">
                   <a:blip/>
                   <a:srcRect/>
@@ -16258,7 +16262,7 @@
               </a14:hiddenFill>
             </a:ext>
             <a:ext uri="{91240B29-F687-4f45-9708-019B960494DF}">
-              <a14:hiddenLine xmlns="" xmlns:a14="http://schemas.microsoft.com/office/drawing/2010/main" w="9525">
+              <a14:hiddenLine xmlns:a14="http://schemas.microsoft.com/office/drawing/2010/main" xmlns="" w="9525">
                 <a:solidFill>
                   <a:srgbClr val="000000"/>
                 </a:solidFill>
@@ -16268,7 +16272,7 @@
               </a14:hiddenLine>
             </a:ext>
             <a:ext uri="{AF507438-7753-43e0-B8FC-AC1667EBCBE1}">
-              <a14:hiddenEffects xmlns="" xmlns:a14="http://schemas.microsoft.com/office/drawing/2010/main">
+              <a14:hiddenEffects xmlns:a14="http://schemas.microsoft.com/office/drawing/2010/main" xmlns="">
                 <a:effectLst>
                   <a:outerShdw blurRad="63500" dist="38099" dir="2700000" algn="ctr" rotWithShape="0">
                     <a:srgbClr val="000000">
@@ -17971,7 +17975,7 @@
           <a:effectLst/>
           <a:extLst>
             <a:ext uri="{909E8E84-426E-40dd-AFC4-6F175D3DCCD1}">
-              <a14:hiddenFill xmlns="" xmlns:a14="http://schemas.microsoft.com/office/drawing/2010/main">
+              <a14:hiddenFill xmlns:a14="http://schemas.microsoft.com/office/drawing/2010/main" xmlns="">
                 <a:blipFill dpi="0" rotWithShape="0">
                   <a:blip/>
                   <a:srcRect/>
@@ -17982,7 +17986,7 @@
               </a14:hiddenFill>
             </a:ext>
             <a:ext uri="{91240B29-F687-4f45-9708-019B960494DF}">
-              <a14:hiddenLine xmlns="" xmlns:a14="http://schemas.microsoft.com/office/drawing/2010/main" w="9525">
+              <a14:hiddenLine xmlns:a14="http://schemas.microsoft.com/office/drawing/2010/main" xmlns="" w="9525">
                 <a:solidFill>
                   <a:srgbClr val="000000"/>
                 </a:solidFill>
@@ -17992,7 +17996,7 @@
               </a14:hiddenLine>
             </a:ext>
             <a:ext uri="{AF507438-7753-43e0-B8FC-AC1667EBCBE1}">
-              <a14:hiddenEffects xmlns="" xmlns:a14="http://schemas.microsoft.com/office/drawing/2010/main">
+              <a14:hiddenEffects xmlns:a14="http://schemas.microsoft.com/office/drawing/2010/main" xmlns="">
                 <a:effectLst>
                   <a:outerShdw blurRad="63500" dist="38099" dir="2700000" algn="ctr" rotWithShape="0">
                     <a:srgbClr val="000000">
@@ -19320,7 +19324,7 @@
           <a:effectLst/>
           <a:extLst>
             <a:ext uri="{909E8E84-426E-40dd-AFC4-6F175D3DCCD1}">
-              <a14:hiddenFill xmlns="" xmlns:a14="http://schemas.microsoft.com/office/drawing/2010/main">
+              <a14:hiddenFill xmlns:a14="http://schemas.microsoft.com/office/drawing/2010/main" xmlns="">
                 <a:blipFill dpi="0" rotWithShape="0">
                   <a:blip/>
                   <a:srcRect/>
@@ -19331,7 +19335,7 @@
               </a14:hiddenFill>
             </a:ext>
             <a:ext uri="{91240B29-F687-4f45-9708-019B960494DF}">
-              <a14:hiddenLine xmlns="" xmlns:a14="http://schemas.microsoft.com/office/drawing/2010/main" w="9525">
+              <a14:hiddenLine xmlns:a14="http://schemas.microsoft.com/office/drawing/2010/main" xmlns="" w="9525">
                 <a:solidFill>
                   <a:srgbClr val="000000"/>
                 </a:solidFill>
@@ -19341,7 +19345,7 @@
               </a14:hiddenLine>
             </a:ext>
             <a:ext uri="{AF507438-7753-43e0-B8FC-AC1667EBCBE1}">
-              <a14:hiddenEffects xmlns="" xmlns:a14="http://schemas.microsoft.com/office/drawing/2010/main">
+              <a14:hiddenEffects xmlns:a14="http://schemas.microsoft.com/office/drawing/2010/main" xmlns="">
                 <a:effectLst>
                   <a:outerShdw blurRad="63500" dist="38099" dir="2700000" algn="ctr" rotWithShape="0">
                     <a:srgbClr val="000000">
@@ -21528,7 +21532,7 @@
           <a:effectLst/>
           <a:extLst>
             <a:ext uri="{909E8E84-426E-40dd-AFC4-6F175D3DCCD1}">
-              <a14:hiddenFill xmlns="" xmlns:a14="http://schemas.microsoft.com/office/drawing/2010/main">
+              <a14:hiddenFill xmlns:a14="http://schemas.microsoft.com/office/drawing/2010/main" xmlns="">
                 <a:blipFill dpi="0" rotWithShape="0">
                   <a:blip/>
                   <a:srcRect/>
@@ -21539,7 +21543,7 @@
               </a14:hiddenFill>
             </a:ext>
             <a:ext uri="{91240B29-F687-4f45-9708-019B960494DF}">
-              <a14:hiddenLine xmlns="" xmlns:a14="http://schemas.microsoft.com/office/drawing/2010/main" w="9525">
+              <a14:hiddenLine xmlns:a14="http://schemas.microsoft.com/office/drawing/2010/main" xmlns="" w="9525">
                 <a:solidFill>
                   <a:srgbClr val="000000"/>
                 </a:solidFill>
@@ -21549,7 +21553,7 @@
               </a14:hiddenLine>
             </a:ext>
             <a:ext uri="{AF507438-7753-43e0-B8FC-AC1667EBCBE1}">
-              <a14:hiddenEffects xmlns="" xmlns:a14="http://schemas.microsoft.com/office/drawing/2010/main">
+              <a14:hiddenEffects xmlns:a14="http://schemas.microsoft.com/office/drawing/2010/main" xmlns="">
                 <a:effectLst>
                   <a:outerShdw blurRad="63500" dist="38099" dir="2700000" algn="ctr" rotWithShape="0">
                     <a:srgbClr val="000000">
@@ -23588,7 +23592,7 @@
           <a:effectLst/>
           <a:extLst>
             <a:ext uri="{909E8E84-426E-40dd-AFC4-6F175D3DCCD1}">
-              <a14:hiddenFill xmlns="" xmlns:a14="http://schemas.microsoft.com/office/drawing/2010/main">
+              <a14:hiddenFill xmlns:a14="http://schemas.microsoft.com/office/drawing/2010/main" xmlns="">
                 <a:blipFill dpi="0" rotWithShape="0">
                   <a:blip/>
                   <a:srcRect/>
@@ -23599,7 +23603,7 @@
               </a14:hiddenFill>
             </a:ext>
             <a:ext uri="{91240B29-F687-4f45-9708-019B960494DF}">
-              <a14:hiddenLine xmlns="" xmlns:a14="http://schemas.microsoft.com/office/drawing/2010/main" w="9525">
+              <a14:hiddenLine xmlns:a14="http://schemas.microsoft.com/office/drawing/2010/main" xmlns="" w="9525">
                 <a:solidFill>
                   <a:srgbClr val="000000"/>
                 </a:solidFill>
@@ -23609,7 +23613,7 @@
               </a14:hiddenLine>
             </a:ext>
             <a:ext uri="{AF507438-7753-43e0-B8FC-AC1667EBCBE1}">
-              <a14:hiddenEffects xmlns="" xmlns:a14="http://schemas.microsoft.com/office/drawing/2010/main">
+              <a14:hiddenEffects xmlns:a14="http://schemas.microsoft.com/office/drawing/2010/main" xmlns="">
                 <a:effectLst>
                   <a:outerShdw blurRad="63500" dist="38099" dir="2700000" algn="ctr" rotWithShape="0">
                     <a:srgbClr val="000000">

</xml_diff>